<commit_message>
tweaked summaries. Shifted Versioning to Tags section
</commit_message>
<xml_diff>
--- a/Branches.pptx
+++ b/Branches.pptx
@@ -3140,19 +3140,11 @@
           <a:p>
             <a:r>
               <a:rPr lang="en-US" dirty="0" smtClean="0"/>
-              <a:t>A brief summary of </a:t>
-            </a:r>
-            <a:r>
-              <a:rPr lang="en-US" smtClean="0"/>
-              <a:t>what </a:t>
-            </a:r>
-            <a:r>
-              <a:rPr lang="en-US" smtClean="0"/>
-              <a:t>branches are </a:t>
-            </a:r>
-            <a:r>
-              <a:rPr lang="en-US" dirty="0" smtClean="0"/>
-              <a:t>how they work.</a:t>
+              <a:t>Segregating </a:t>
+            </a:r>
+            <a:r>
+              <a:rPr lang="en-US" smtClean="0"/>
+              <a:t>your codes</a:t>
             </a:r>
             <a:endParaRPr lang="en-SG" dirty="0"/>
           </a:p>

</xml_diff>

<commit_message>
added New Branch, Switch Branch and Delete Branch parts
</commit_message>
<xml_diff>
--- a/Branches.pptx
+++ b/Branches.pptx
@@ -7,10 +7,12 @@
   <p:sldIdLst>
     <p:sldId id="256" r:id="rId2"/>
     <p:sldId id="259" r:id="rId3"/>
-    <p:sldId id="260" r:id="rId4"/>
-    <p:sldId id="261" r:id="rId5"/>
-    <p:sldId id="262" r:id="rId6"/>
-    <p:sldId id="263" r:id="rId7"/>
+    <p:sldId id="264" r:id="rId4"/>
+    <p:sldId id="265" r:id="rId5"/>
+    <p:sldId id="260" r:id="rId6"/>
+    <p:sldId id="261" r:id="rId7"/>
+    <p:sldId id="262" r:id="rId8"/>
+    <p:sldId id="263" r:id="rId9"/>
   </p:sldIdLst>
   <p:sldSz cx="9144000" cy="6858000" type="screen4x3"/>
   <p:notesSz cx="6858000" cy="9144000"/>
@@ -3323,6 +3325,561 @@
             <p:ph idx="1"/>
           </p:nvPr>
         </p:nvSpPr>
+        <p:spPr/>
+        <p:txBody>
+          <a:bodyPr/>
+          <a:lstStyle/>
+          <a:p>
+            <a:pPr marL="0" indent="0">
+              <a:buNone/>
+            </a:pPr>
+            <a:r>
+              <a:rPr lang="en-US" dirty="0" smtClean="0"/>
+              <a:t>To create a new branch, the command is:</a:t>
+            </a:r>
+          </a:p>
+          <a:p>
+            <a:pPr marL="0" indent="0">
+              <a:buNone/>
+            </a:pPr>
+            <a:endParaRPr lang="en-US" dirty="0"/>
+          </a:p>
+          <a:p>
+            <a:pPr marL="0" indent="0">
+              <a:buNone/>
+            </a:pPr>
+            <a:r>
+              <a:rPr lang="en-US" dirty="0" smtClean="0"/>
+              <a:t>This creates a new branch with the name you supplied. This command, without the "-b" part will allow you to switch branches. So if you want to switch to the master branch if you're in the develop branch now, type:</a:t>
+            </a:r>
+          </a:p>
+          <a:p>
+            <a:pPr marL="0" indent="0">
+              <a:buNone/>
+            </a:pPr>
+            <a:endParaRPr lang="en-SG" dirty="0"/>
+          </a:p>
+        </p:txBody>
+      </p:sp>
+      <p:sp>
+        <p:nvSpPr>
+          <p:cNvPr id="4" name="Rectangle 3"/>
+          <p:cNvSpPr/>
+          <p:nvPr/>
+        </p:nvSpPr>
+        <p:spPr>
+          <a:xfrm flipH="1">
+            <a:off x="611560" y="2298099"/>
+            <a:ext cx="3888432" cy="360040"/>
+          </a:xfrm>
+          <a:prstGeom prst="rect">
+            <a:avLst/>
+          </a:prstGeom>
+          <a:solidFill>
+            <a:schemeClr val="tx1"/>
+          </a:solidFill>
+          <a:ln>
+            <a:noFill/>
+          </a:ln>
+        </p:spPr>
+        <p:style>
+          <a:lnRef idx="2">
+            <a:schemeClr val="accent1">
+              <a:shade val="50000"/>
+            </a:schemeClr>
+          </a:lnRef>
+          <a:fillRef idx="1">
+            <a:schemeClr val="accent1"/>
+          </a:fillRef>
+          <a:effectRef idx="0">
+            <a:schemeClr val="accent1"/>
+          </a:effectRef>
+          <a:fontRef idx="minor">
+            <a:schemeClr val="lt1"/>
+          </a:fontRef>
+        </p:style>
+        <p:txBody>
+          <a:bodyPr rtlCol="0" anchor="ctr"/>
+          <a:lstStyle/>
+          <a:p>
+            <a:r>
+              <a:rPr lang="en-SG" b="1" dirty="0">
+                <a:solidFill>
+                  <a:srgbClr val="00B050"/>
+                </a:solidFill>
+                <a:latin typeface="Arial" pitchFamily="34" charset="0"/>
+                <a:cs typeface="Arial" pitchFamily="34" charset="0"/>
+              </a:rPr>
+              <a:t>git </a:t>
+            </a:r>
+            <a:r>
+              <a:rPr lang="en-SG" b="1" dirty="0" smtClean="0">
+                <a:solidFill>
+                  <a:srgbClr val="00B050"/>
+                </a:solidFill>
+                <a:latin typeface="Arial" pitchFamily="34" charset="0"/>
+                <a:cs typeface="Arial" pitchFamily="34" charset="0"/>
+              </a:rPr>
+              <a:t> checkout  </a:t>
+            </a:r>
+            <a:r>
+              <a:rPr lang="en-SG" b="1" dirty="0">
+                <a:solidFill>
+                  <a:srgbClr val="00B050"/>
+                </a:solidFill>
+                <a:latin typeface="Arial" pitchFamily="34" charset="0"/>
+                <a:cs typeface="Arial" pitchFamily="34" charset="0"/>
+              </a:rPr>
+              <a:t>-</a:t>
+            </a:r>
+            <a:r>
+              <a:rPr lang="en-SG" b="1" dirty="0" smtClean="0">
+                <a:solidFill>
+                  <a:srgbClr val="00B050"/>
+                </a:solidFill>
+                <a:latin typeface="Arial" pitchFamily="34" charset="0"/>
+                <a:cs typeface="Arial" pitchFamily="34" charset="0"/>
+              </a:rPr>
+              <a:t>b  </a:t>
+            </a:r>
+            <a:r>
+              <a:rPr lang="en-SG" b="1" dirty="0" smtClean="0">
+                <a:solidFill>
+                  <a:schemeClr val="bg1"/>
+                </a:solidFill>
+                <a:latin typeface="Arial" pitchFamily="34" charset="0"/>
+                <a:cs typeface="Arial" pitchFamily="34" charset="0"/>
+              </a:rPr>
+              <a:t>&lt;branch name&gt;</a:t>
+            </a:r>
+            <a:endParaRPr lang="en-US" b="1" dirty="0">
+              <a:solidFill>
+                <a:schemeClr val="bg1"/>
+              </a:solidFill>
+              <a:latin typeface="Arial" pitchFamily="34" charset="0"/>
+              <a:cs typeface="Arial" pitchFamily="34" charset="0"/>
+            </a:endParaRPr>
+          </a:p>
+        </p:txBody>
+      </p:sp>
+      <p:sp>
+        <p:nvSpPr>
+          <p:cNvPr id="5" name="Rectangle 4"/>
+          <p:cNvSpPr/>
+          <p:nvPr/>
+        </p:nvSpPr>
+        <p:spPr>
+          <a:xfrm flipH="1">
+            <a:off x="609180" y="5445224"/>
+            <a:ext cx="2666675" cy="360040"/>
+          </a:xfrm>
+          <a:prstGeom prst="rect">
+            <a:avLst/>
+          </a:prstGeom>
+          <a:solidFill>
+            <a:schemeClr val="tx1"/>
+          </a:solidFill>
+          <a:ln>
+            <a:noFill/>
+          </a:ln>
+        </p:spPr>
+        <p:style>
+          <a:lnRef idx="2">
+            <a:schemeClr val="accent1">
+              <a:shade val="50000"/>
+            </a:schemeClr>
+          </a:lnRef>
+          <a:fillRef idx="1">
+            <a:schemeClr val="accent1"/>
+          </a:fillRef>
+          <a:effectRef idx="0">
+            <a:schemeClr val="accent1"/>
+          </a:effectRef>
+          <a:fontRef idx="minor">
+            <a:schemeClr val="lt1"/>
+          </a:fontRef>
+        </p:style>
+        <p:txBody>
+          <a:bodyPr rtlCol="0" anchor="ctr"/>
+          <a:lstStyle/>
+          <a:p>
+            <a:r>
+              <a:rPr lang="en-SG" b="1" dirty="0">
+                <a:solidFill>
+                  <a:srgbClr val="00B050"/>
+                </a:solidFill>
+                <a:latin typeface="Arial" pitchFamily="34" charset="0"/>
+                <a:cs typeface="Arial" pitchFamily="34" charset="0"/>
+              </a:rPr>
+              <a:t>git </a:t>
+            </a:r>
+            <a:r>
+              <a:rPr lang="en-SG" b="1" dirty="0" smtClean="0">
+                <a:solidFill>
+                  <a:srgbClr val="00B050"/>
+                </a:solidFill>
+                <a:latin typeface="Arial" pitchFamily="34" charset="0"/>
+                <a:cs typeface="Arial" pitchFamily="34" charset="0"/>
+              </a:rPr>
+              <a:t> checkout  master</a:t>
+            </a:r>
+            <a:endParaRPr lang="en-US" b="1" dirty="0">
+              <a:solidFill>
+                <a:schemeClr val="bg1"/>
+              </a:solidFill>
+              <a:latin typeface="Arial" pitchFamily="34" charset="0"/>
+              <a:cs typeface="Arial" pitchFamily="34" charset="0"/>
+            </a:endParaRPr>
+          </a:p>
+        </p:txBody>
+      </p:sp>
+    </p:spTree>
+    <p:extLst>
+      <p:ext uri="{BB962C8B-B14F-4D97-AF65-F5344CB8AC3E}">
+        <p14:creationId xmlns:p14="http://schemas.microsoft.com/office/powerpoint/2010/main" val="3547584412"/>
+      </p:ext>
+    </p:extLst>
+  </p:cSld>
+  <p:clrMapOvr>
+    <a:masterClrMapping/>
+  </p:clrMapOvr>
+  <p:timing>
+    <p:tnLst>
+      <p:par>
+        <p:cTn id="1" dur="indefinite" restart="never" nodeType="tmRoot"/>
+      </p:par>
+    </p:tnLst>
+  </p:timing>
+</p:sld>
+</file>
+
+<file path=ppt/slides/slide4.xml><?xml version="1.0" encoding="utf-8"?>
+<p:sld xmlns:a="http://schemas.openxmlformats.org/drawingml/2006/main" xmlns:r="http://schemas.openxmlformats.org/officeDocument/2006/relationships" xmlns:p="http://schemas.openxmlformats.org/presentationml/2006/main">
+  <p:cSld>
+    <p:spTree>
+      <p:nvGrpSpPr>
+        <p:cNvPr id="1" name=""/>
+        <p:cNvGrpSpPr/>
+        <p:nvPr/>
+      </p:nvGrpSpPr>
+      <p:grpSpPr>
+        <a:xfrm>
+          <a:off x="0" y="0"/>
+          <a:ext cx="0" cy="0"/>
+          <a:chOff x="0" y="0"/>
+          <a:chExt cx="0" cy="0"/>
+        </a:xfrm>
+      </p:grpSpPr>
+      <p:sp>
+        <p:nvSpPr>
+          <p:cNvPr id="2" name="Title 1"/>
+          <p:cNvSpPr>
+            <a:spLocks noGrp="1"/>
+          </p:cNvSpPr>
+          <p:nvPr>
+            <p:ph type="title"/>
+          </p:nvPr>
+        </p:nvSpPr>
+        <p:spPr/>
+        <p:txBody>
+          <a:bodyPr/>
+          <a:lstStyle/>
+          <a:p>
+            <a:r>
+              <a:rPr lang="en-US" dirty="0" smtClean="0"/>
+              <a:t>Branches</a:t>
+            </a:r>
+            <a:endParaRPr lang="en-SG" dirty="0"/>
+          </a:p>
+        </p:txBody>
+      </p:sp>
+      <p:sp>
+        <p:nvSpPr>
+          <p:cNvPr id="3" name="Content Placeholder 2"/>
+          <p:cNvSpPr>
+            <a:spLocks noGrp="1"/>
+          </p:cNvSpPr>
+          <p:nvPr>
+            <p:ph idx="1"/>
+          </p:nvPr>
+        </p:nvSpPr>
+        <p:spPr/>
+        <p:txBody>
+          <a:bodyPr/>
+          <a:lstStyle/>
+          <a:p>
+            <a:pPr marL="0" indent="0">
+              <a:buNone/>
+            </a:pPr>
+            <a:r>
+              <a:rPr lang="en-US" dirty="0" smtClean="0"/>
+              <a:t>If you want to delete a branch, maybe because the feature is complete, you can always use this:</a:t>
+            </a:r>
+          </a:p>
+          <a:p>
+            <a:pPr marL="0" indent="0">
+              <a:buNone/>
+            </a:pPr>
+            <a:endParaRPr lang="en-US" dirty="0"/>
+          </a:p>
+          <a:p>
+            <a:pPr marL="0" indent="0">
+              <a:buNone/>
+            </a:pPr>
+            <a:r>
+              <a:rPr lang="en-US" dirty="0" smtClean="0"/>
+              <a:t>This deletes your local branch. You'll need this command						if you want to delete the branch on </a:t>
+            </a:r>
+            <a:r>
+              <a:rPr lang="en-US" smtClean="0"/>
+              <a:t>the server as well.</a:t>
+            </a:r>
+            <a:endParaRPr lang="en-US" dirty="0" smtClean="0"/>
+          </a:p>
+        </p:txBody>
+      </p:sp>
+      <p:sp>
+        <p:nvSpPr>
+          <p:cNvPr id="4" name="Rectangle 3"/>
+          <p:cNvSpPr/>
+          <p:nvPr/>
+        </p:nvSpPr>
+        <p:spPr>
+          <a:xfrm flipH="1">
+            <a:off x="611560" y="2780928"/>
+            <a:ext cx="3672408" cy="360040"/>
+          </a:xfrm>
+          <a:prstGeom prst="rect">
+            <a:avLst/>
+          </a:prstGeom>
+          <a:solidFill>
+            <a:schemeClr val="tx1"/>
+          </a:solidFill>
+          <a:ln>
+            <a:noFill/>
+          </a:ln>
+        </p:spPr>
+        <p:style>
+          <a:lnRef idx="2">
+            <a:schemeClr val="accent1">
+              <a:shade val="50000"/>
+            </a:schemeClr>
+          </a:lnRef>
+          <a:fillRef idx="1">
+            <a:schemeClr val="accent1"/>
+          </a:fillRef>
+          <a:effectRef idx="0">
+            <a:schemeClr val="accent1"/>
+          </a:effectRef>
+          <a:fontRef idx="minor">
+            <a:schemeClr val="lt1"/>
+          </a:fontRef>
+        </p:style>
+        <p:txBody>
+          <a:bodyPr rtlCol="0" anchor="ctr"/>
+          <a:lstStyle/>
+          <a:p>
+            <a:r>
+              <a:rPr lang="en-SG" b="1" dirty="0" smtClean="0">
+                <a:solidFill>
+                  <a:srgbClr val="00B050"/>
+                </a:solidFill>
+                <a:latin typeface="Arial" pitchFamily="34" charset="0"/>
+                <a:cs typeface="Arial" pitchFamily="34" charset="0"/>
+              </a:rPr>
+              <a:t>git  branch  -D  </a:t>
+            </a:r>
+            <a:r>
+              <a:rPr lang="en-SG" b="1" dirty="0" smtClean="0">
+                <a:solidFill>
+                  <a:schemeClr val="bg1"/>
+                </a:solidFill>
+                <a:latin typeface="Arial" pitchFamily="34" charset="0"/>
+                <a:cs typeface="Arial" pitchFamily="34" charset="0"/>
+              </a:rPr>
+              <a:t>&lt;branch  name&gt;</a:t>
+            </a:r>
+            <a:endParaRPr lang="en-US" b="1" dirty="0">
+              <a:solidFill>
+                <a:schemeClr val="bg1"/>
+              </a:solidFill>
+              <a:latin typeface="Arial" pitchFamily="34" charset="0"/>
+              <a:cs typeface="Arial" pitchFamily="34" charset="0"/>
+            </a:endParaRPr>
+          </a:p>
+        </p:txBody>
+      </p:sp>
+      <p:sp>
+        <p:nvSpPr>
+          <p:cNvPr id="5" name="Rectangle 4"/>
+          <p:cNvSpPr/>
+          <p:nvPr/>
+        </p:nvSpPr>
+        <p:spPr>
+          <a:xfrm flipH="1">
+            <a:off x="2267744" y="3861048"/>
+            <a:ext cx="4500500" cy="360040"/>
+          </a:xfrm>
+          <a:prstGeom prst="rect">
+            <a:avLst/>
+          </a:prstGeom>
+          <a:solidFill>
+            <a:schemeClr val="tx1"/>
+          </a:solidFill>
+          <a:ln>
+            <a:noFill/>
+          </a:ln>
+        </p:spPr>
+        <p:style>
+          <a:lnRef idx="2">
+            <a:schemeClr val="accent1">
+              <a:shade val="50000"/>
+            </a:schemeClr>
+          </a:lnRef>
+          <a:fillRef idx="1">
+            <a:schemeClr val="accent1"/>
+          </a:fillRef>
+          <a:effectRef idx="0">
+            <a:schemeClr val="accent1"/>
+          </a:effectRef>
+          <a:fontRef idx="minor">
+            <a:schemeClr val="lt1"/>
+          </a:fontRef>
+        </p:style>
+        <p:txBody>
+          <a:bodyPr rtlCol="0" anchor="ctr"/>
+          <a:lstStyle/>
+          <a:p>
+            <a:r>
+              <a:rPr lang="en-US" b="1" dirty="0">
+                <a:solidFill>
+                  <a:srgbClr val="00B050"/>
+                </a:solidFill>
+                <a:latin typeface="Arial" pitchFamily="34" charset="0"/>
+                <a:cs typeface="Arial" pitchFamily="34" charset="0"/>
+              </a:rPr>
+              <a:t> </a:t>
+            </a:r>
+            <a:r>
+              <a:rPr lang="en-SG" b="1" dirty="0">
+                <a:solidFill>
+                  <a:srgbClr val="00B050"/>
+                </a:solidFill>
+                <a:latin typeface="Arial" pitchFamily="34" charset="0"/>
+                <a:cs typeface="Arial" pitchFamily="34" charset="0"/>
+              </a:rPr>
+              <a:t>git push origin --delete </a:t>
+            </a:r>
+            <a:r>
+              <a:rPr lang="en-SG" b="1" dirty="0">
+                <a:solidFill>
+                  <a:schemeClr val="bg1"/>
+                </a:solidFill>
+                <a:latin typeface="Arial" pitchFamily="34" charset="0"/>
+                <a:cs typeface="Arial" pitchFamily="34" charset="0"/>
+              </a:rPr>
+              <a:t>&lt;</a:t>
+            </a:r>
+            <a:r>
+              <a:rPr lang="en-SG" b="1" dirty="0" smtClean="0">
+                <a:solidFill>
+                  <a:schemeClr val="bg1"/>
+                </a:solidFill>
+                <a:latin typeface="Arial" pitchFamily="34" charset="0"/>
+                <a:cs typeface="Arial" pitchFamily="34" charset="0"/>
+              </a:rPr>
+              <a:t>branch name</a:t>
+            </a:r>
+            <a:r>
+              <a:rPr lang="en-SG" b="1" dirty="0">
+                <a:solidFill>
+                  <a:schemeClr val="bg1"/>
+                </a:solidFill>
+                <a:latin typeface="Arial" pitchFamily="34" charset="0"/>
+                <a:cs typeface="Arial" pitchFamily="34" charset="0"/>
+              </a:rPr>
+              <a:t>&gt;</a:t>
+            </a:r>
+            <a:endParaRPr lang="en-US" b="1" dirty="0">
+              <a:solidFill>
+                <a:schemeClr val="bg1"/>
+              </a:solidFill>
+              <a:latin typeface="Arial" pitchFamily="34" charset="0"/>
+              <a:cs typeface="Arial" pitchFamily="34" charset="0"/>
+            </a:endParaRPr>
+          </a:p>
+        </p:txBody>
+      </p:sp>
+    </p:spTree>
+    <p:extLst>
+      <p:ext uri="{BB962C8B-B14F-4D97-AF65-F5344CB8AC3E}">
+        <p14:creationId xmlns:p14="http://schemas.microsoft.com/office/powerpoint/2010/main" val="2901595632"/>
+      </p:ext>
+    </p:extLst>
+  </p:cSld>
+  <p:clrMapOvr>
+    <a:masterClrMapping/>
+  </p:clrMapOvr>
+  <p:timing>
+    <p:tnLst>
+      <p:par>
+        <p:cTn id="1" dur="indefinite" restart="never" nodeType="tmRoot"/>
+      </p:par>
+    </p:tnLst>
+  </p:timing>
+</p:sld>
+</file>
+
+<file path=ppt/slides/slide5.xml><?xml version="1.0" encoding="utf-8"?>
+<p:sld xmlns:a="http://schemas.openxmlformats.org/drawingml/2006/main" xmlns:r="http://schemas.openxmlformats.org/officeDocument/2006/relationships" xmlns:p="http://schemas.openxmlformats.org/presentationml/2006/main">
+  <p:cSld>
+    <p:spTree>
+      <p:nvGrpSpPr>
+        <p:cNvPr id="1" name=""/>
+        <p:cNvGrpSpPr/>
+        <p:nvPr/>
+      </p:nvGrpSpPr>
+      <p:grpSpPr>
+        <a:xfrm>
+          <a:off x="0" y="0"/>
+          <a:ext cx="0" cy="0"/>
+          <a:chOff x="0" y="0"/>
+          <a:chExt cx="0" cy="0"/>
+        </a:xfrm>
+      </p:grpSpPr>
+      <p:sp>
+        <p:nvSpPr>
+          <p:cNvPr id="2" name="Title 1"/>
+          <p:cNvSpPr>
+            <a:spLocks noGrp="1"/>
+          </p:cNvSpPr>
+          <p:nvPr>
+            <p:ph type="title"/>
+          </p:nvPr>
+        </p:nvSpPr>
+        <p:spPr/>
+        <p:txBody>
+          <a:bodyPr/>
+          <a:lstStyle/>
+          <a:p>
+            <a:r>
+              <a:rPr lang="en-US" dirty="0" smtClean="0"/>
+              <a:t>Branches</a:t>
+            </a:r>
+            <a:endParaRPr lang="en-SG" dirty="0"/>
+          </a:p>
+        </p:txBody>
+      </p:sp>
+      <p:sp>
+        <p:nvSpPr>
+          <p:cNvPr id="3" name="Content Placeholder 2"/>
+          <p:cNvSpPr>
+            <a:spLocks noGrp="1"/>
+          </p:cNvSpPr>
+          <p:nvPr>
+            <p:ph idx="1"/>
+          </p:nvPr>
+        </p:nvSpPr>
         <p:spPr>
           <a:xfrm>
             <a:off x="457200" y="1340768"/>
@@ -3373,10 +3930,17 @@
   <p:clrMapOvr>
     <a:masterClrMapping/>
   </p:clrMapOvr>
+  <p:timing>
+    <p:tnLst>
+      <p:par>
+        <p:cTn id="1" dur="indefinite" restart="never" nodeType="tmRoot"/>
+      </p:par>
+    </p:tnLst>
+  </p:timing>
 </p:sld>
 </file>
 
-<file path=ppt/slides/slide4.xml><?xml version="1.0" encoding="utf-8"?>
+<file path=ppt/slides/slide6.xml><?xml version="1.0" encoding="utf-8"?>
 <p:sld xmlns:a="http://schemas.openxmlformats.org/drawingml/2006/main" xmlns:r="http://schemas.openxmlformats.org/officeDocument/2006/relationships" xmlns:p="http://schemas.openxmlformats.org/presentationml/2006/main">
   <p:cSld>
     <p:spTree>
@@ -3848,10 +4412,17 @@
   <p:clrMapOvr>
     <a:masterClrMapping/>
   </p:clrMapOvr>
+  <p:timing>
+    <p:tnLst>
+      <p:par>
+        <p:cTn id="1" dur="indefinite" restart="never" nodeType="tmRoot"/>
+      </p:par>
+    </p:tnLst>
+  </p:timing>
 </p:sld>
 </file>
 
-<file path=ppt/slides/slide5.xml><?xml version="1.0" encoding="utf-8"?>
+<file path=ppt/slides/slide7.xml><?xml version="1.0" encoding="utf-8"?>
 <p:sld xmlns:a="http://schemas.openxmlformats.org/drawingml/2006/main" xmlns:r="http://schemas.openxmlformats.org/officeDocument/2006/relationships" xmlns:p="http://schemas.openxmlformats.org/presentationml/2006/main">
   <p:cSld>
     <p:spTree>
@@ -4416,10 +4987,17 @@
   <p:clrMapOvr>
     <a:masterClrMapping/>
   </p:clrMapOvr>
+  <p:timing>
+    <p:tnLst>
+      <p:par>
+        <p:cTn id="1" dur="indefinite" restart="never" nodeType="tmRoot"/>
+      </p:par>
+    </p:tnLst>
+  </p:timing>
 </p:sld>
 </file>
 
-<file path=ppt/slides/slide6.xml><?xml version="1.0" encoding="utf-8"?>
+<file path=ppt/slides/slide8.xml><?xml version="1.0" encoding="utf-8"?>
 <p:sld xmlns:a="http://schemas.openxmlformats.org/drawingml/2006/main" xmlns:r="http://schemas.openxmlformats.org/officeDocument/2006/relationships" xmlns:p="http://schemas.openxmlformats.org/presentationml/2006/main">
   <p:cSld>
     <p:spTree>
@@ -5144,6 +5722,13 @@
   <p:clrMapOvr>
     <a:masterClrMapping/>
   </p:clrMapOvr>
+  <p:timing>
+    <p:tnLst>
+      <p:par>
+        <p:cTn id="1" dur="indefinite" restart="never" nodeType="tmRoot"/>
+      </p:par>
+    </p:tnLst>
+  </p:timing>
 </p:sld>
 </file>
 

</xml_diff>

<commit_message>
added MongoDB setup instructions
</commit_message>
<xml_diff>
--- a/Branches.pptx
+++ b/Branches.pptx
@@ -3605,7 +3605,9 @@
         </p:nvSpPr>
         <p:spPr/>
         <p:txBody>
-          <a:bodyPr/>
+          <a:bodyPr>
+            <a:normAutofit fontScale="92500"/>
+          </a:bodyPr>
           <a:lstStyle/>
           <a:p>
             <a:pPr marL="0" indent="0">
@@ -3613,7 +3615,28 @@
             </a:pPr>
             <a:r>
               <a:rPr lang="en-US" dirty="0" smtClean="0"/>
-              <a:t>If you want to delete a branch, maybe because the feature is complete, you can always use this:</a:t>
+              <a:t>If you want to list out all the branches, use the command 			to see your local branches, or</a:t>
+            </a:r>
+            <a:r>
+              <a:rPr lang="en-US" dirty="0"/>
+              <a:t>	</a:t>
+            </a:r>
+            <a:r>
+              <a:rPr lang="en-US" dirty="0" smtClean="0"/>
+              <a:t>		to see your remote branches.</a:t>
+            </a:r>
+          </a:p>
+          <a:p>
+            <a:pPr marL="0" indent="0">
+              <a:buNone/>
+            </a:pPr>
+            <a:r>
+              <a:rPr lang="en-US" dirty="0" smtClean="0"/>
+              <a:t>If </a:t>
+            </a:r>
+            <a:r>
+              <a:rPr lang="en-US" dirty="0" smtClean="0"/>
+              <a:t>you want to delete a branch, maybe because the feature is complete, you can always use this:</a:t>
             </a:r>
           </a:p>
           <a:p>
@@ -3628,13 +3651,8 @@
             </a:pPr>
             <a:r>
               <a:rPr lang="en-US" dirty="0" smtClean="0"/>
-              <a:t>This deletes your local branch. You'll need this command						if you want to delete the branch on </a:t>
-            </a:r>
-            <a:r>
-              <a:rPr lang="en-US" smtClean="0"/>
-              <a:t>the server as well.</a:t>
-            </a:r>
-            <a:endParaRPr lang="en-US" dirty="0" smtClean="0"/>
+              <a:t>This deletes your local branch. You'll need this command						if you want to delete the branch on the server as well.</a:t>
+            </a:r>
           </a:p>
         </p:txBody>
       </p:sp>
@@ -3646,7 +3664,7 @@
         </p:nvSpPr>
         <p:spPr>
           <a:xfrm flipH="1">
-            <a:off x="611560" y="2780928"/>
+            <a:off x="611560" y="4149080"/>
             <a:ext cx="3672408" cy="360040"/>
           </a:xfrm>
           <a:prstGeom prst="rect">
@@ -3717,7 +3735,7 @@
         </p:nvSpPr>
         <p:spPr>
           <a:xfrm flipH="1">
-            <a:off x="2267744" y="3861048"/>
+            <a:off x="2267744" y="5229200"/>
             <a:ext cx="4500500" cy="360040"/>
           </a:xfrm>
           <a:prstGeom prst="rect">
@@ -3799,6 +3817,148 @@
                 <a:cs typeface="Arial" pitchFamily="34" charset="0"/>
               </a:rPr>
               <a:t>&gt;</a:t>
+            </a:r>
+            <a:endParaRPr lang="en-US" b="1" dirty="0">
+              <a:solidFill>
+                <a:schemeClr val="bg1"/>
+              </a:solidFill>
+              <a:latin typeface="Arial" pitchFamily="34" charset="0"/>
+              <a:cs typeface="Arial" pitchFamily="34" charset="0"/>
+            </a:endParaRPr>
+          </a:p>
+        </p:txBody>
+      </p:sp>
+      <p:sp>
+        <p:nvSpPr>
+          <p:cNvPr id="6" name="Rectangle 5"/>
+          <p:cNvSpPr/>
+          <p:nvPr/>
+        </p:nvSpPr>
+        <p:spPr>
+          <a:xfrm flipH="1">
+            <a:off x="2315667" y="2132856"/>
+            <a:ext cx="1680269" cy="360040"/>
+          </a:xfrm>
+          <a:prstGeom prst="rect">
+            <a:avLst/>
+          </a:prstGeom>
+          <a:solidFill>
+            <a:schemeClr val="tx1"/>
+          </a:solidFill>
+          <a:ln>
+            <a:noFill/>
+          </a:ln>
+        </p:spPr>
+        <p:style>
+          <a:lnRef idx="2">
+            <a:schemeClr val="accent1">
+              <a:shade val="50000"/>
+            </a:schemeClr>
+          </a:lnRef>
+          <a:fillRef idx="1">
+            <a:schemeClr val="accent1"/>
+          </a:fillRef>
+          <a:effectRef idx="0">
+            <a:schemeClr val="accent1"/>
+          </a:effectRef>
+          <a:fontRef idx="minor">
+            <a:schemeClr val="lt1"/>
+          </a:fontRef>
+        </p:style>
+        <p:txBody>
+          <a:bodyPr rtlCol="0" anchor="ctr"/>
+          <a:lstStyle/>
+          <a:p>
+            <a:r>
+              <a:rPr lang="en-SG" b="1" dirty="0" smtClean="0">
+                <a:solidFill>
+                  <a:srgbClr val="00B050"/>
+                </a:solidFill>
+                <a:latin typeface="Arial" pitchFamily="34" charset="0"/>
+                <a:cs typeface="Arial" pitchFamily="34" charset="0"/>
+              </a:rPr>
+              <a:t>git  </a:t>
+            </a:r>
+            <a:r>
+              <a:rPr lang="en-SG" b="1" dirty="0" smtClean="0">
+                <a:solidFill>
+                  <a:srgbClr val="00B050"/>
+                </a:solidFill>
+                <a:latin typeface="Arial" pitchFamily="34" charset="0"/>
+                <a:cs typeface="Arial" pitchFamily="34" charset="0"/>
+              </a:rPr>
+              <a:t>branch  -l</a:t>
+            </a:r>
+            <a:endParaRPr lang="en-US" b="1" dirty="0">
+              <a:solidFill>
+                <a:schemeClr val="bg1"/>
+              </a:solidFill>
+              <a:latin typeface="Arial" pitchFamily="34" charset="0"/>
+              <a:cs typeface="Arial" pitchFamily="34" charset="0"/>
+            </a:endParaRPr>
+          </a:p>
+        </p:txBody>
+      </p:sp>
+      <p:sp>
+        <p:nvSpPr>
+          <p:cNvPr id="10" name="Rectangle 9"/>
+          <p:cNvSpPr/>
+          <p:nvPr/>
+        </p:nvSpPr>
+        <p:spPr>
+          <a:xfrm flipH="1">
+            <a:off x="1235547" y="2636912"/>
+            <a:ext cx="1680269" cy="360040"/>
+          </a:xfrm>
+          <a:prstGeom prst="rect">
+            <a:avLst/>
+          </a:prstGeom>
+          <a:solidFill>
+            <a:schemeClr val="tx1"/>
+          </a:solidFill>
+          <a:ln>
+            <a:noFill/>
+          </a:ln>
+        </p:spPr>
+        <p:style>
+          <a:lnRef idx="2">
+            <a:schemeClr val="accent1">
+              <a:shade val="50000"/>
+            </a:schemeClr>
+          </a:lnRef>
+          <a:fillRef idx="1">
+            <a:schemeClr val="accent1"/>
+          </a:fillRef>
+          <a:effectRef idx="0">
+            <a:schemeClr val="accent1"/>
+          </a:effectRef>
+          <a:fontRef idx="minor">
+            <a:schemeClr val="lt1"/>
+          </a:fontRef>
+        </p:style>
+        <p:txBody>
+          <a:bodyPr rtlCol="0" anchor="ctr"/>
+          <a:lstStyle/>
+          <a:p>
+            <a:r>
+              <a:rPr lang="en-SG" b="1" dirty="0" smtClean="0">
+                <a:solidFill>
+                  <a:srgbClr val="00B050"/>
+                </a:solidFill>
+                <a:latin typeface="Arial" pitchFamily="34" charset="0"/>
+                <a:cs typeface="Arial" pitchFamily="34" charset="0"/>
+              </a:rPr>
+              <a:t>git  </a:t>
+            </a:r>
+            <a:r>
+              <a:rPr lang="en-SG" b="1" dirty="0" smtClean="0">
+                <a:solidFill>
+                  <a:srgbClr val="00B050"/>
+                </a:solidFill>
+                <a:latin typeface="Arial" pitchFamily="34" charset="0"/>
+                <a:cs typeface="Arial" pitchFamily="34" charset="0"/>
+              </a:rPr>
+              <a:t>branch  -r</a:t>
             </a:r>
             <a:endParaRPr lang="en-US" b="1" dirty="0">
               <a:solidFill>

</xml_diff>